<commit_message>
using http with ppt file
</commit_message>
<xml_diff>
--- a/new.pptx
+++ b/new.pptx
@@ -104,6 +104,11 @@
       </a:defRPr>
     </a:lvl9pPr>
   </p:defaultTextStyle>
+  <p:extLst>
+    <p:ext uri="{EFAFB233-063F-42B5-8137-9DF3F51BA10A}">
+      <p15:sldGuideLst xmlns:p15="http://schemas.microsoft.com/office/powerpoint/2012/main"/>
+    </p:ext>
+  </p:extLst>
 </p:presentation>
 </file>
 
@@ -2981,28 +2986,9 @@
           <a:p>
             <a:r>
               <a:rPr lang="en-US" smtClean="0"/>
-              <a:t>hi</a:t>
-            </a:r>
-            <a:endParaRPr lang="en-IN"/>
-          </a:p>
-        </p:txBody>
-      </p:sp>
-      <p:sp>
-        <p:nvSpPr>
-          <p:cNvPr id="3" name="Subtitle 2"/>
-          <p:cNvSpPr>
-            <a:spLocks noGrp="1"/>
-          </p:cNvSpPr>
-          <p:nvPr>
-            <p:ph type="subTitle" idx="1"/>
-          </p:nvPr>
-        </p:nvSpPr>
-        <p:spPr/>
-        <p:txBody>
-          <a:bodyPr/>
-          <a:lstStyle/>
-          <a:p>
-            <a:endParaRPr lang="en-IN"/>
+              <a:t>Hi again</a:t>
+            </a:r>
+            <a:endParaRPr lang="en-IN" dirty="0"/>
           </a:p>
         </p:txBody>
       </p:sp>

</xml_diff>